<commit_message>
Minor presentation edits. Additional notes through Getting Started item 7.
</commit_message>
<xml_diff>
--- a/GettingStartedWithElixir.pptx
+++ b/GettingStartedWithElixir.pptx
@@ -288,7 +288,7 @@
           <a:p>
             <a:fld id="{ECD19FB2-3AAB-4D03-B13A-2960828C78E3}" type="datetimeFigureOut">
               <a:rPr lang="en-US" smtClean="0"/>
-              <a:t>2/7/16</a:t>
+              <a:t>2/10/16</a:t>
             </a:fld>
             <a:endParaRPr lang="en-US" dirty="0"/>
           </a:p>
@@ -527,7 +527,7 @@
           <a:p>
             <a:fld id="{0DED02AE-B9A4-47BD-AF8E-97E16144138B}" type="datetimeFigureOut">
               <a:rPr lang="en-US" smtClean="0"/>
-              <a:t>2/7/16</a:t>
+              <a:t>2/10/16</a:t>
             </a:fld>
             <a:endParaRPr lang="en-US" dirty="0"/>
           </a:p>
@@ -712,7 +712,7 @@
           <a:p>
             <a:fld id="{CF0FD78B-DB02-4362-BCDC-98A55456977C}" type="datetimeFigureOut">
               <a:rPr lang="en-US" smtClean="0"/>
-              <a:t>2/7/16</a:t>
+              <a:t>2/10/16</a:t>
             </a:fld>
             <a:endParaRPr lang="en-US" dirty="0"/>
           </a:p>
@@ -892,7 +892,7 @@
           <a:p>
             <a:fld id="{99916976-5D93-46E4-A98A-FAD63E4D0EA8}" type="datetimeFigureOut">
               <a:rPr lang="en-US" smtClean="0"/>
-              <a:t>2/7/16</a:t>
+              <a:t>2/10/16</a:t>
             </a:fld>
             <a:endParaRPr lang="en-US" dirty="0"/>
           </a:p>
@@ -1151,7 +1151,7 @@
           <a:p>
             <a:fld id="{0F39F4F5-F4D2-4D2A-AB60-88D37ADCB869}" type="datetimeFigureOut">
               <a:rPr lang="en-US" smtClean="0"/>
-              <a:t>2/7/16</a:t>
+              <a:t>2/10/16</a:t>
             </a:fld>
             <a:endParaRPr lang="en-US" dirty="0"/>
           </a:p>
@@ -1487,7 +1487,7 @@
           <a:p>
             <a:fld id="{D23BC6CE-6D1E-47E5-8859-F31AC5380EB2}" type="datetimeFigureOut">
               <a:rPr lang="en-US" smtClean="0"/>
-              <a:t>2/7/16</a:t>
+              <a:t>2/10/16</a:t>
             </a:fld>
             <a:endParaRPr lang="en-US" dirty="0"/>
           </a:p>
@@ -1943,7 +1943,7 @@
           <a:p>
             <a:fld id="{B1B4E7C4-4DA4-404D-9965-B13F2DD7D8BF}" type="datetimeFigureOut">
               <a:rPr lang="en-US" smtClean="0"/>
-              <a:t>2/7/16</a:t>
+              <a:t>2/10/16</a:t>
             </a:fld>
             <a:endParaRPr lang="en-US" dirty="0"/>
           </a:p>
@@ -2066,7 +2066,7 @@
           <a:p>
             <a:fld id="{476FB7AA-4A53-424F-AD41-70827B6504BA}" type="datetimeFigureOut">
               <a:rPr lang="en-US" smtClean="0"/>
-              <a:t>2/7/16</a:t>
+              <a:t>2/10/16</a:t>
             </a:fld>
             <a:endParaRPr lang="en-US" dirty="0"/>
           </a:p>
@@ -2166,7 +2166,7 @@
           <a:p>
             <a:fld id="{E7884882-FB12-4BC8-9960-9AD8104D7FAE}" type="datetimeFigureOut">
               <a:rPr lang="en-US" smtClean="0"/>
-              <a:t>2/7/16</a:t>
+              <a:t>2/10/16</a:t>
             </a:fld>
             <a:endParaRPr lang="en-US" dirty="0"/>
           </a:p>
@@ -2458,7 +2458,7 @@
           <a:p>
             <a:fld id="{F7D1BD23-6E54-4D9D-AD88-A2813C73CC25}" type="datetimeFigureOut">
               <a:rPr lang="en-US" smtClean="0"/>
-              <a:t>2/7/16</a:t>
+              <a:t>2/10/16</a:t>
             </a:fld>
             <a:endParaRPr lang="en-US" dirty="0"/>
           </a:p>
@@ -2788,7 +2788,7 @@
           <a:p>
             <a:fld id="{1471A834-4F3C-4AF9-9C74-05EC35A0F292}" type="datetimeFigureOut">
               <a:rPr lang="en-US" smtClean="0"/>
-              <a:t>2/7/16</a:t>
+              <a:t>2/10/16</a:t>
             </a:fld>
             <a:endParaRPr lang="en-US" dirty="0"/>
           </a:p>
@@ -3042,7 +3042,7 @@
           <a:p>
             <a:fld id="{51CF1133-3259-4C45-BABA-5B62D9C6F78D}" type="datetimeFigureOut">
               <a:rPr lang="en-US" smtClean="0"/>
-              <a:t>2/7/16</a:t>
+              <a:t>2/10/16</a:t>
             </a:fld>
             <a:endParaRPr lang="en-US" dirty="0"/>
           </a:p>
@@ -3666,15 +3666,7 @@
           <a:p>
             <a:r>
               <a:rPr lang="en-US" sz="3000" dirty="0" smtClean="0"/>
-              <a:t>First </a:t>
-            </a:r>
-            <a:r>
-              <a:rPr lang="en-US" sz="3000" dirty="0" smtClean="0"/>
-              <a:t>three or so </a:t>
-            </a:r>
-            <a:r>
-              <a:rPr lang="en-US" sz="3000" dirty="0" smtClean="0"/>
-              <a:t>sessions will be lead by me</a:t>
+              <a:t>First three or so sessions will be lead by me</a:t>
             </a:r>
           </a:p>
           <a:p>
@@ -3845,40 +3837,8 @@
               <a:t>Erlang</a:t>
             </a:r>
             <a:r>
-              <a:rPr lang="en-US" dirty="0" smtClean="0"/>
+              <a:rPr lang="en-US" dirty="0"/>
               <a:t>?</a:t>
-            </a:r>
-            <a:r>
-              <a:rPr lang="en-US" dirty="0">
-                <a:solidFill>
-                  <a:srgbClr val="000000"/>
-                </a:solidFill>
-              </a:rPr>
-              <a:t> </a:t>
-            </a:r>
-            <a:r>
-              <a:rPr lang="en-US" dirty="0" smtClean="0">
-                <a:solidFill>
-                  <a:srgbClr val="000000"/>
-                </a:solidFill>
-              </a:rPr>
-              <a:t>         </a:t>
-            </a:r>
-            <a:r>
-              <a:rPr lang="en-US" sz="3200" baseline="30000" dirty="0" smtClean="0">
-                <a:solidFill>
-                  <a:srgbClr val="000000"/>
-                </a:solidFill>
-              </a:rPr>
-              <a:t>(</a:t>
-            </a:r>
-            <a:r>
-              <a:rPr lang="en-US" sz="3200" baseline="30000" dirty="0">
-                <a:solidFill>
-                  <a:srgbClr val="000000"/>
-                </a:solidFill>
-              </a:rPr>
-              <a:t>I reserve the right to be wrong)</a:t>
             </a:r>
             <a:endParaRPr lang="en-US" dirty="0"/>
           </a:p>
@@ -4002,11 +3962,11 @@
           <a:p>
             <a:r>
               <a:rPr lang="en-US" dirty="0" smtClean="0"/>
-              <a:t>What is Elixir?            </a:t>
-            </a:r>
-            <a:r>
-              <a:rPr lang="en-US" sz="3200" baseline="30000" dirty="0" smtClean="0"/>
-              <a:t>(I reserve the right to be wrong)</a:t>
+              <a:t>What is Elixir</a:t>
+            </a:r>
+            <a:r>
+              <a:rPr lang="en-US" dirty="0" smtClean="0"/>
+              <a:t>?</a:t>
             </a:r>
             <a:endParaRPr lang="en-US" sz="3200" dirty="0"/>
           </a:p>

</xml_diff>